<commit_message>
added new layout for dual slide titles
</commit_message>
<xml_diff>
--- a/powerpoint/ims_robotics_template.pptx
+++ b/powerpoint/ims_robotics_template.pptx
@@ -13,8 +13,8 @@
   <p:sldIdLst>
     <p:sldId id="256" r:id="rId2"/>
     <p:sldId id="258" r:id="rId3"/>
-    <p:sldId id="260" r:id="rId4"/>
-    <p:sldId id="259" r:id="rId5"/>
+    <p:sldId id="261" r:id="rId4"/>
+    <p:sldId id="260" r:id="rId5"/>
   </p:sldIdLst>
   <p:sldSz cx="12192000" cy="6858000"/>
   <p:notesSz cx="6858000" cy="9144000"/>
@@ -217,7 +217,7 @@
           <a:p>
             <a:fld id="{7D8DF1FE-F640-4523-86A6-06DCD1B496B2}" type="datetimeFigureOut">
               <a:rPr lang="en-US" smtClean="0"/>
-              <a:t>9/29/2017</a:t>
+              <a:t>12/5/2018</a:t>
             </a:fld>
             <a:endParaRPr lang="en-US"/>
           </a:p>
@@ -382,7 +382,7 @@
           <a:p>
             <a:fld id="{CF7CF559-BA39-496B-AE3C-32458147CE74}" type="datetimeFigureOut">
               <a:rPr lang="en-US" smtClean="0"/>
-              <a:t>9/29/2017</a:t>
+              <a:t>12/5/2018</a:t>
             </a:fld>
             <a:endParaRPr lang="en-US"/>
           </a:p>
@@ -886,10 +886,6 @@
           <a:bodyPr/>
           <a:lstStyle/>
           <a:p>
-            <a:r>
-              <a:rPr lang="en-US" smtClean="0"/>
-              <a:t>Robotics Technology</a:t>
-            </a:r>
             <a:endParaRPr lang="en-US"/>
           </a:p>
         </p:txBody>
@@ -1114,10 +1110,6 @@
           <a:bodyPr/>
           <a:lstStyle/>
           <a:p>
-            <a:r>
-              <a:rPr lang="en-US" smtClean="0"/>
-              <a:t>Robotics Technology</a:t>
-            </a:r>
             <a:endParaRPr lang="en-US"/>
           </a:p>
         </p:txBody>
@@ -1412,10 +1404,6 @@
           <a:bodyPr/>
           <a:lstStyle/>
           <a:p>
-            <a:r>
-              <a:rPr lang="en-US" smtClean="0"/>
-              <a:t>Robotics Technology</a:t>
-            </a:r>
             <a:endParaRPr lang="en-US"/>
           </a:p>
         </p:txBody>
@@ -1588,10 +1576,6 @@
           <a:bodyPr/>
           <a:lstStyle/>
           <a:p>
-            <a:r>
-              <a:rPr lang="en-US" smtClean="0"/>
-              <a:t>Robotics Technology</a:t>
-            </a:r>
             <a:endParaRPr lang="en-US"/>
           </a:p>
         </p:txBody>
@@ -1681,7 +1665,684 @@
 </file>
 
 <file path=ppt/slideLayouts/slideLayout5.xml><?xml version="1.0" encoding="utf-8"?>
-<p:sldLayout xmlns:a="http://schemas.openxmlformats.org/drawingml/2006/main" xmlns:r="http://schemas.openxmlformats.org/officeDocument/2006/relationships" xmlns:p="http://schemas.openxmlformats.org/presentationml/2006/main" type="blank" preserve="1">
+<p:sldLayout xmlns:a="http://schemas.openxmlformats.org/drawingml/2006/main" xmlns:r="http://schemas.openxmlformats.org/officeDocument/2006/relationships" xmlns:p="http://schemas.openxmlformats.org/presentationml/2006/main" preserve="1" userDrawn="1">
+  <p:cSld name="Title+Subtitle">
+    <p:spTree>
+      <p:nvGrpSpPr>
+        <p:cNvPr id="1" name=""/>
+        <p:cNvGrpSpPr/>
+        <p:nvPr/>
+      </p:nvGrpSpPr>
+      <p:grpSpPr>
+        <a:xfrm>
+          <a:off x="0" y="0"/>
+          <a:ext cx="0" cy="0"/>
+          <a:chOff x="0" y="0"/>
+          <a:chExt cx="0" cy="0"/>
+        </a:xfrm>
+      </p:grpSpPr>
+      <p:sp>
+        <p:nvSpPr>
+          <p:cNvPr id="3" name="Date Placeholder 2"/>
+          <p:cNvSpPr>
+            <a:spLocks noGrp="1"/>
+          </p:cNvSpPr>
+          <p:nvPr>
+            <p:ph type="dt" sz="half" idx="10"/>
+          </p:nvPr>
+        </p:nvSpPr>
+        <p:spPr/>
+        <p:txBody>
+          <a:bodyPr/>
+          <a:lstStyle/>
+          <a:p>
+            <a:r>
+              <a:rPr lang="et-EE" smtClean="0"/>
+              <a:t>Fall 2017</a:t>
+            </a:r>
+            <a:endParaRPr lang="en-US"/>
+          </a:p>
+        </p:txBody>
+      </p:sp>
+      <p:sp>
+        <p:nvSpPr>
+          <p:cNvPr id="4" name="Footer Placeholder 3"/>
+          <p:cNvSpPr>
+            <a:spLocks noGrp="1"/>
+          </p:cNvSpPr>
+          <p:nvPr>
+            <p:ph type="ftr" sz="quarter" idx="11"/>
+          </p:nvPr>
+        </p:nvSpPr>
+        <p:spPr/>
+        <p:txBody>
+          <a:bodyPr/>
+          <a:lstStyle/>
+          <a:p>
+            <a:endParaRPr lang="en-US"/>
+          </a:p>
+        </p:txBody>
+      </p:sp>
+      <p:sp>
+        <p:nvSpPr>
+          <p:cNvPr id="5" name="Slide Number Placeholder 4"/>
+          <p:cNvSpPr>
+            <a:spLocks noGrp="1"/>
+          </p:cNvSpPr>
+          <p:nvPr>
+            <p:ph type="sldNum" sz="quarter" idx="12"/>
+          </p:nvPr>
+        </p:nvSpPr>
+        <p:spPr/>
+        <p:txBody>
+          <a:bodyPr/>
+          <a:lstStyle/>
+          <a:p>
+            <a:fld id="{4596AF0A-323D-43CD-827B-42B76E65D3DE}" type="slidenum">
+              <a:rPr lang="en-US" smtClean="0"/>
+              <a:t>‹#›</a:t>
+            </a:fld>
+            <a:endParaRPr lang="en-US"/>
+          </a:p>
+        </p:txBody>
+      </p:sp>
+      <p:pic>
+        <p:nvPicPr>
+          <p:cNvPr id="6" name="Picture 2" descr="http://www.ut.ee/logod/TY%20%C3%BCldlogod/Ringlogo/T%C3%9C_logod_17122015_ring_hall.png"/>
+          <p:cNvPicPr>
+            <a:picLocks noChangeAspect="1" noChangeArrowheads="1"/>
+          </p:cNvPicPr>
+          <p:nvPr userDrawn="1"/>
+        </p:nvPicPr>
+        <p:blipFill>
+          <a:blip r:embed="rId2" cstate="print">
+            <a:extLst>
+              <a:ext uri="{28A0092B-C50C-407E-A947-70E740481C1C}">
+                <a14:useLocalDpi xmlns:a14="http://schemas.microsoft.com/office/drawing/2010/main" val="0"/>
+              </a:ext>
+            </a:extLst>
+          </a:blip>
+          <a:srcRect/>
+          <a:stretch>
+            <a:fillRect/>
+          </a:stretch>
+        </p:blipFill>
+        <p:spPr bwMode="auto">
+          <a:xfrm>
+            <a:off x="132082" y="6101432"/>
+            <a:ext cx="631316" cy="638686"/>
+          </a:xfrm>
+          <a:prstGeom prst="rect">
+            <a:avLst/>
+          </a:prstGeom>
+          <a:noFill/>
+          <a:extLst>
+            <a:ext uri="{909E8E84-426E-40DD-AFC4-6F175D3DCCD1}">
+              <a14:hiddenFill xmlns:a14="http://schemas.microsoft.com/office/drawing/2010/main">
+                <a:solidFill>
+                  <a:srgbClr val="FFFFFF"/>
+                </a:solidFill>
+              </a14:hiddenFill>
+            </a:ext>
+          </a:extLst>
+        </p:spPr>
+      </p:pic>
+      <p:sp>
+        <p:nvSpPr>
+          <p:cNvPr id="8" name="Title 1"/>
+          <p:cNvSpPr>
+            <a:spLocks noGrp="1"/>
+          </p:cNvSpPr>
+          <p:nvPr>
+            <p:ph type="title" hasCustomPrompt="1"/>
+          </p:nvPr>
+        </p:nvSpPr>
+        <p:spPr>
+          <a:xfrm>
+            <a:off x="838200" y="692331"/>
+            <a:ext cx="8498747" cy="597813"/>
+          </a:xfrm>
+        </p:spPr>
+        <p:txBody>
+          <a:bodyPr anchor="b" anchorCtr="0">
+            <a:normAutofit/>
+          </a:bodyPr>
+          <a:lstStyle>
+            <a:lvl1pPr>
+              <a:defRPr sz="2400" b="1" baseline="0">
+                <a:solidFill>
+                  <a:srgbClr val="EF4E68"/>
+                </a:solidFill>
+              </a:defRPr>
+            </a:lvl1pPr>
+          </a:lstStyle>
+          <a:p>
+            <a:r>
+              <a:rPr lang="et-EE" dirty="0" err="1" smtClean="0"/>
+              <a:t>Click</a:t>
+            </a:r>
+            <a:r>
+              <a:rPr lang="et-EE" dirty="0" smtClean="0"/>
+              <a:t> </a:t>
+            </a:r>
+            <a:r>
+              <a:rPr lang="et-EE" dirty="0" err="1" smtClean="0"/>
+              <a:t>to</a:t>
+            </a:r>
+            <a:r>
+              <a:rPr lang="et-EE" dirty="0" smtClean="0"/>
+              <a:t> </a:t>
+            </a:r>
+            <a:r>
+              <a:rPr lang="et-EE" dirty="0" err="1" smtClean="0"/>
+              <a:t>add</a:t>
+            </a:r>
+            <a:r>
+              <a:rPr lang="et-EE" dirty="0" smtClean="0"/>
+              <a:t> </a:t>
+            </a:r>
+            <a:r>
+              <a:rPr lang="et-EE" dirty="0" err="1" smtClean="0"/>
+              <a:t>subsection</a:t>
+            </a:r>
+            <a:r>
+              <a:rPr lang="et-EE" dirty="0" smtClean="0"/>
+              <a:t> </a:t>
+            </a:r>
+            <a:r>
+              <a:rPr lang="et-EE" dirty="0" err="1" smtClean="0"/>
+              <a:t>title</a:t>
+            </a:r>
+            <a:endParaRPr lang="en-US" dirty="0"/>
+          </a:p>
+        </p:txBody>
+      </p:sp>
+      <p:sp>
+        <p:nvSpPr>
+          <p:cNvPr id="17" name="Primary Title"/>
+          <p:cNvSpPr>
+            <a:spLocks noGrp="1"/>
+          </p:cNvSpPr>
+          <p:nvPr>
+            <p:ph type="body" sz="quarter" idx="13" hasCustomPrompt="1"/>
+          </p:nvPr>
+        </p:nvSpPr>
+        <p:spPr>
+          <a:xfrm>
+            <a:off x="838200" y="372912"/>
+            <a:ext cx="8498747" cy="597244"/>
+          </a:xfrm>
+        </p:spPr>
+        <p:txBody>
+          <a:bodyPr/>
+          <a:lstStyle>
+            <a:lvl1pPr marL="0" indent="0" algn="l" defTabSz="914400" rtl="0" eaLnBrk="1" latinLnBrk="0" hangingPunct="1">
+              <a:lnSpc>
+                <a:spcPct val="90000"/>
+              </a:lnSpc>
+              <a:spcBef>
+                <a:spcPct val="0"/>
+              </a:spcBef>
+              <a:buNone/>
+              <a:defRPr lang="en-US" sz="3600" b="1" kern="1200" dirty="0" smtClean="0">
+                <a:solidFill>
+                  <a:schemeClr val="bg2">
+                    <a:lumMod val="50000"/>
+                  </a:schemeClr>
+                </a:solidFill>
+                <a:latin typeface="+mj-lt"/>
+                <a:ea typeface="+mj-ea"/>
+                <a:cs typeface="+mj-cs"/>
+              </a:defRPr>
+            </a:lvl1pPr>
+            <a:lvl2pPr marL="457200" indent="0">
+              <a:buNone/>
+              <a:defRPr/>
+            </a:lvl2pPr>
+            <a:lvl3pPr marL="914400" indent="0">
+              <a:buNone/>
+              <a:defRPr/>
+            </a:lvl3pPr>
+            <a:lvl4pPr marL="1371600" indent="0">
+              <a:buNone/>
+              <a:defRPr/>
+            </a:lvl4pPr>
+            <a:lvl5pPr marL="1828800" indent="0">
+              <a:buNone/>
+              <a:defRPr/>
+            </a:lvl5pPr>
+          </a:lstStyle>
+          <a:p>
+            <a:pPr lvl="0"/>
+            <a:r>
+              <a:rPr lang="et-EE" dirty="0" err="1" smtClean="0"/>
+              <a:t>Click</a:t>
+            </a:r>
+            <a:r>
+              <a:rPr lang="et-EE" dirty="0" smtClean="0"/>
+              <a:t> </a:t>
+            </a:r>
+            <a:r>
+              <a:rPr lang="et-EE" dirty="0" err="1" smtClean="0"/>
+              <a:t>to</a:t>
+            </a:r>
+            <a:r>
+              <a:rPr lang="et-EE" dirty="0" smtClean="0"/>
+              <a:t> </a:t>
+            </a:r>
+            <a:r>
+              <a:rPr lang="et-EE" dirty="0" err="1" smtClean="0"/>
+              <a:t>add</a:t>
+            </a:r>
+            <a:r>
+              <a:rPr lang="et-EE" dirty="0" smtClean="0"/>
+              <a:t> </a:t>
+            </a:r>
+            <a:r>
+              <a:rPr lang="et-EE" dirty="0" err="1" smtClean="0"/>
+              <a:t>primary</a:t>
+            </a:r>
+            <a:r>
+              <a:rPr lang="et-EE" dirty="0" smtClean="0"/>
+              <a:t> </a:t>
+            </a:r>
+            <a:r>
+              <a:rPr lang="et-EE" dirty="0" err="1" smtClean="0"/>
+              <a:t>title</a:t>
+            </a:r>
+            <a:endParaRPr lang="en-US" dirty="0" smtClean="0"/>
+          </a:p>
+        </p:txBody>
+      </p:sp>
+    </p:spTree>
+    <p:extLst>
+      <p:ext uri="{BB962C8B-B14F-4D97-AF65-F5344CB8AC3E}">
+        <p14:creationId xmlns:p14="http://schemas.microsoft.com/office/powerpoint/2010/main" val="423844466"/>
+      </p:ext>
+    </p:extLst>
+  </p:cSld>
+  <p:clrMapOvr>
+    <a:masterClrMapping/>
+  </p:clrMapOvr>
+  <p:timing>
+    <p:tnLst>
+      <p:par>
+        <p:cTn id="1" dur="indefinite" restart="never" nodeType="tmRoot"/>
+      </p:par>
+    </p:tnLst>
+  </p:timing>
+</p:sldLayout>
+</file>
+
+<file path=ppt/slideLayouts/slideLayout6.xml><?xml version="1.0" encoding="utf-8"?>
+<p:sldLayout xmlns:a="http://schemas.openxmlformats.org/drawingml/2006/main" xmlns:r="http://schemas.openxmlformats.org/officeDocument/2006/relationships" xmlns:p="http://schemas.openxmlformats.org/presentationml/2006/main" preserve="1" userDrawn="1">
+  <p:cSld name="1_Title+Subtitle">
+    <p:spTree>
+      <p:nvGrpSpPr>
+        <p:cNvPr id="1" name=""/>
+        <p:cNvGrpSpPr/>
+        <p:nvPr/>
+      </p:nvGrpSpPr>
+      <p:grpSpPr>
+        <a:xfrm>
+          <a:off x="0" y="0"/>
+          <a:ext cx="0" cy="0"/>
+          <a:chOff x="0" y="0"/>
+          <a:chExt cx="0" cy="0"/>
+        </a:xfrm>
+      </p:grpSpPr>
+      <p:sp>
+        <p:nvSpPr>
+          <p:cNvPr id="3" name="Date Placeholder 2"/>
+          <p:cNvSpPr>
+            <a:spLocks noGrp="1"/>
+          </p:cNvSpPr>
+          <p:nvPr>
+            <p:ph type="dt" sz="half" idx="10"/>
+          </p:nvPr>
+        </p:nvSpPr>
+        <p:spPr/>
+        <p:txBody>
+          <a:bodyPr/>
+          <a:lstStyle/>
+          <a:p>
+            <a:r>
+              <a:rPr lang="et-EE" smtClean="0"/>
+              <a:t>Fall 2017</a:t>
+            </a:r>
+            <a:endParaRPr lang="en-US"/>
+          </a:p>
+        </p:txBody>
+      </p:sp>
+      <p:sp>
+        <p:nvSpPr>
+          <p:cNvPr id="4" name="Footer Placeholder 3"/>
+          <p:cNvSpPr>
+            <a:spLocks noGrp="1"/>
+          </p:cNvSpPr>
+          <p:nvPr>
+            <p:ph type="ftr" sz="quarter" idx="11"/>
+          </p:nvPr>
+        </p:nvSpPr>
+        <p:spPr/>
+        <p:txBody>
+          <a:bodyPr/>
+          <a:lstStyle/>
+          <a:p>
+            <a:endParaRPr lang="en-US"/>
+          </a:p>
+        </p:txBody>
+      </p:sp>
+      <p:sp>
+        <p:nvSpPr>
+          <p:cNvPr id="5" name="Slide Number Placeholder 4"/>
+          <p:cNvSpPr>
+            <a:spLocks noGrp="1"/>
+          </p:cNvSpPr>
+          <p:nvPr>
+            <p:ph type="sldNum" sz="quarter" idx="12"/>
+          </p:nvPr>
+        </p:nvSpPr>
+        <p:spPr/>
+        <p:txBody>
+          <a:bodyPr/>
+          <a:lstStyle/>
+          <a:p>
+            <a:fld id="{4596AF0A-323D-43CD-827B-42B76E65D3DE}" type="slidenum">
+              <a:rPr lang="en-US" smtClean="0"/>
+              <a:t>‹#›</a:t>
+            </a:fld>
+            <a:endParaRPr lang="en-US"/>
+          </a:p>
+        </p:txBody>
+      </p:sp>
+      <p:pic>
+        <p:nvPicPr>
+          <p:cNvPr id="6" name="Picture 2" descr="http://www.ut.ee/logod/TY%20%C3%BCldlogod/Ringlogo/T%C3%9C_logod_17122015_ring_hall.png"/>
+          <p:cNvPicPr>
+            <a:picLocks noChangeAspect="1" noChangeArrowheads="1"/>
+          </p:cNvPicPr>
+          <p:nvPr userDrawn="1"/>
+        </p:nvPicPr>
+        <p:blipFill>
+          <a:blip r:embed="rId2" cstate="print">
+            <a:extLst>
+              <a:ext uri="{28A0092B-C50C-407E-A947-70E740481C1C}">
+                <a14:useLocalDpi xmlns:a14="http://schemas.microsoft.com/office/drawing/2010/main" val="0"/>
+              </a:ext>
+            </a:extLst>
+          </a:blip>
+          <a:srcRect/>
+          <a:stretch>
+            <a:fillRect/>
+          </a:stretch>
+        </p:blipFill>
+        <p:spPr bwMode="auto">
+          <a:xfrm>
+            <a:off x="132082" y="6101432"/>
+            <a:ext cx="631316" cy="638686"/>
+          </a:xfrm>
+          <a:prstGeom prst="rect">
+            <a:avLst/>
+          </a:prstGeom>
+          <a:noFill/>
+          <a:extLst>
+            <a:ext uri="{909E8E84-426E-40DD-AFC4-6F175D3DCCD1}">
+              <a14:hiddenFill xmlns:a14="http://schemas.microsoft.com/office/drawing/2010/main">
+                <a:solidFill>
+                  <a:srgbClr val="FFFFFF"/>
+                </a:solidFill>
+              </a14:hiddenFill>
+            </a:ext>
+          </a:extLst>
+        </p:spPr>
+      </p:pic>
+      <p:sp>
+        <p:nvSpPr>
+          <p:cNvPr id="8" name="Title 1"/>
+          <p:cNvSpPr>
+            <a:spLocks noGrp="1"/>
+          </p:cNvSpPr>
+          <p:nvPr>
+            <p:ph type="title" hasCustomPrompt="1"/>
+          </p:nvPr>
+        </p:nvSpPr>
+        <p:spPr>
+          <a:xfrm>
+            <a:off x="838200" y="692331"/>
+            <a:ext cx="8498747" cy="597813"/>
+          </a:xfrm>
+        </p:spPr>
+        <p:txBody>
+          <a:bodyPr anchor="b" anchorCtr="0">
+            <a:normAutofit/>
+          </a:bodyPr>
+          <a:lstStyle>
+            <a:lvl1pPr>
+              <a:defRPr sz="2400" b="1" baseline="0">
+                <a:solidFill>
+                  <a:srgbClr val="EF4E68"/>
+                </a:solidFill>
+              </a:defRPr>
+            </a:lvl1pPr>
+          </a:lstStyle>
+          <a:p>
+            <a:r>
+              <a:rPr lang="et-EE" dirty="0" err="1" smtClean="0"/>
+              <a:t>Click</a:t>
+            </a:r>
+            <a:r>
+              <a:rPr lang="et-EE" dirty="0" smtClean="0"/>
+              <a:t> </a:t>
+            </a:r>
+            <a:r>
+              <a:rPr lang="et-EE" dirty="0" err="1" smtClean="0"/>
+              <a:t>to</a:t>
+            </a:r>
+            <a:r>
+              <a:rPr lang="et-EE" dirty="0" smtClean="0"/>
+              <a:t> </a:t>
+            </a:r>
+            <a:r>
+              <a:rPr lang="et-EE" dirty="0" err="1" smtClean="0"/>
+              <a:t>add</a:t>
+            </a:r>
+            <a:r>
+              <a:rPr lang="et-EE" dirty="0" smtClean="0"/>
+              <a:t> </a:t>
+            </a:r>
+            <a:r>
+              <a:rPr lang="et-EE" dirty="0" err="1" smtClean="0"/>
+              <a:t>subsection</a:t>
+            </a:r>
+            <a:r>
+              <a:rPr lang="et-EE" dirty="0" smtClean="0"/>
+              <a:t> </a:t>
+            </a:r>
+            <a:r>
+              <a:rPr lang="et-EE" dirty="0" err="1" smtClean="0"/>
+              <a:t>title</a:t>
+            </a:r>
+            <a:endParaRPr lang="en-US" dirty="0"/>
+          </a:p>
+        </p:txBody>
+      </p:sp>
+      <p:sp>
+        <p:nvSpPr>
+          <p:cNvPr id="17" name="Primary Title"/>
+          <p:cNvSpPr>
+            <a:spLocks noGrp="1"/>
+          </p:cNvSpPr>
+          <p:nvPr>
+            <p:ph type="body" sz="quarter" idx="13" hasCustomPrompt="1"/>
+          </p:nvPr>
+        </p:nvSpPr>
+        <p:spPr>
+          <a:xfrm>
+            <a:off x="838200" y="372912"/>
+            <a:ext cx="8498747" cy="597244"/>
+          </a:xfrm>
+        </p:spPr>
+        <p:txBody>
+          <a:bodyPr/>
+          <a:lstStyle>
+            <a:lvl1pPr marL="0" indent="0" algn="l" defTabSz="914400" rtl="0" eaLnBrk="1" latinLnBrk="0" hangingPunct="1">
+              <a:lnSpc>
+                <a:spcPct val="90000"/>
+              </a:lnSpc>
+              <a:spcBef>
+                <a:spcPct val="0"/>
+              </a:spcBef>
+              <a:buNone/>
+              <a:defRPr lang="en-US" sz="3600" b="1" kern="1200" dirty="0" smtClean="0">
+                <a:solidFill>
+                  <a:schemeClr val="bg2">
+                    <a:lumMod val="50000"/>
+                  </a:schemeClr>
+                </a:solidFill>
+                <a:latin typeface="+mj-lt"/>
+                <a:ea typeface="+mj-ea"/>
+                <a:cs typeface="+mj-cs"/>
+              </a:defRPr>
+            </a:lvl1pPr>
+            <a:lvl2pPr marL="457200" indent="0">
+              <a:buNone/>
+              <a:defRPr/>
+            </a:lvl2pPr>
+            <a:lvl3pPr marL="914400" indent="0">
+              <a:buNone/>
+              <a:defRPr/>
+            </a:lvl3pPr>
+            <a:lvl4pPr marL="1371600" indent="0">
+              <a:buNone/>
+              <a:defRPr/>
+            </a:lvl4pPr>
+            <a:lvl5pPr marL="1828800" indent="0">
+              <a:buNone/>
+              <a:defRPr/>
+            </a:lvl5pPr>
+          </a:lstStyle>
+          <a:p>
+            <a:pPr lvl="0"/>
+            <a:r>
+              <a:rPr lang="et-EE" dirty="0" err="1" smtClean="0"/>
+              <a:t>Click</a:t>
+            </a:r>
+            <a:r>
+              <a:rPr lang="et-EE" dirty="0" smtClean="0"/>
+              <a:t> </a:t>
+            </a:r>
+            <a:r>
+              <a:rPr lang="et-EE" dirty="0" err="1" smtClean="0"/>
+              <a:t>to</a:t>
+            </a:r>
+            <a:r>
+              <a:rPr lang="et-EE" dirty="0" smtClean="0"/>
+              <a:t> </a:t>
+            </a:r>
+            <a:r>
+              <a:rPr lang="et-EE" dirty="0" err="1" smtClean="0"/>
+              <a:t>add</a:t>
+            </a:r>
+            <a:r>
+              <a:rPr lang="et-EE" dirty="0" smtClean="0"/>
+              <a:t> </a:t>
+            </a:r>
+            <a:r>
+              <a:rPr lang="et-EE" dirty="0" err="1" smtClean="0"/>
+              <a:t>primary</a:t>
+            </a:r>
+            <a:r>
+              <a:rPr lang="et-EE" dirty="0" smtClean="0"/>
+              <a:t> </a:t>
+            </a:r>
+            <a:r>
+              <a:rPr lang="et-EE" dirty="0" err="1" smtClean="0"/>
+              <a:t>title</a:t>
+            </a:r>
+            <a:endParaRPr lang="en-US" dirty="0" smtClean="0"/>
+          </a:p>
+        </p:txBody>
+      </p:sp>
+      <p:sp>
+        <p:nvSpPr>
+          <p:cNvPr id="9" name="Content Placeholder 2"/>
+          <p:cNvSpPr>
+            <a:spLocks noGrp="1"/>
+          </p:cNvSpPr>
+          <p:nvPr>
+            <p:ph idx="1"/>
+          </p:nvPr>
+        </p:nvSpPr>
+        <p:spPr>
+          <a:xfrm>
+            <a:off x="838200" y="1493240"/>
+            <a:ext cx="10515600" cy="4683723"/>
+          </a:xfrm>
+        </p:spPr>
+        <p:txBody>
+          <a:bodyPr/>
+          <a:lstStyle/>
+          <a:p>
+            <a:pPr lvl="0"/>
+            <a:r>
+              <a:rPr lang="en-US" dirty="0" smtClean="0"/>
+              <a:t>Edit Master text styles</a:t>
+            </a:r>
+          </a:p>
+          <a:p>
+            <a:pPr lvl="1"/>
+            <a:r>
+              <a:rPr lang="en-US" dirty="0" smtClean="0"/>
+              <a:t>Second level</a:t>
+            </a:r>
+          </a:p>
+          <a:p>
+            <a:pPr lvl="2"/>
+            <a:r>
+              <a:rPr lang="en-US" dirty="0" smtClean="0"/>
+              <a:t>Third level</a:t>
+            </a:r>
+          </a:p>
+          <a:p>
+            <a:pPr lvl="3"/>
+            <a:r>
+              <a:rPr lang="en-US" dirty="0" smtClean="0"/>
+              <a:t>Fourth level</a:t>
+            </a:r>
+          </a:p>
+          <a:p>
+            <a:pPr lvl="4"/>
+            <a:r>
+              <a:rPr lang="en-US" dirty="0" smtClean="0"/>
+              <a:t>Fifth level</a:t>
+            </a:r>
+            <a:endParaRPr lang="en-US" dirty="0"/>
+          </a:p>
+        </p:txBody>
+      </p:sp>
+    </p:spTree>
+    <p:extLst>
+      <p:ext uri="{BB962C8B-B14F-4D97-AF65-F5344CB8AC3E}">
+        <p14:creationId xmlns:p14="http://schemas.microsoft.com/office/powerpoint/2010/main" val="1309965028"/>
+      </p:ext>
+    </p:extLst>
+  </p:cSld>
+  <p:clrMapOvr>
+    <a:masterClrMapping/>
+  </p:clrMapOvr>
+  <p:timing>
+    <p:tnLst>
+      <p:par>
+        <p:cTn id="1" dur="indefinite" restart="never" nodeType="tmRoot"/>
+      </p:par>
+    </p:tnLst>
+  </p:timing>
+</p:sldLayout>
+</file>
+
+<file path=ppt/slideLayouts/slideLayout7.xml><?xml version="1.0" encoding="utf-8"?>
+<p:sldLayout xmlns:a="http://schemas.openxmlformats.org/drawingml/2006/main" xmlns:r="http://schemas.openxmlformats.org/officeDocument/2006/relationships" xmlns:p="http://schemas.openxmlformats.org/presentationml/2006/main" preserve="1" userDrawn="1">
   <p:cSld name="Blank">
     <p:spTree>
       <p:nvGrpSpPr>
@@ -1735,10 +2396,6 @@
           <a:bodyPr/>
           <a:lstStyle/>
           <a:p>
-            <a:r>
-              <a:rPr lang="en-US" smtClean="0"/>
-              <a:t>Robotics Technology</a:t>
-            </a:r>
             <a:endParaRPr lang="en-US"/>
           </a:p>
         </p:txBody>
@@ -2018,10 +2675,6 @@
             </a:lvl1pPr>
           </a:lstStyle>
           <a:p>
-            <a:r>
-              <a:rPr lang="en-US" smtClean="0"/>
-              <a:t>Robotics Technology</a:t>
-            </a:r>
             <a:endParaRPr lang="en-US"/>
           </a:p>
         </p:txBody>
@@ -2076,7 +2729,7 @@
           <p:nvPr userDrawn="1"/>
         </p:nvPicPr>
         <p:blipFill rotWithShape="1">
-          <a:blip r:embed="rId7" cstate="print">
+          <a:blip r:embed="rId9" cstate="print">
             <a:extLst>
               <a:ext uri="{28A0092B-C50C-407E-A947-70E740481C1C}">
                 <a14:useLocalDpi xmlns:a14="http://schemas.microsoft.com/office/drawing/2010/main" val="0"/>
@@ -2109,7 +2762,9 @@
     <p:sldLayoutId id="2147483650" r:id="rId2"/>
     <p:sldLayoutId id="2147483651" r:id="rId3"/>
     <p:sldLayoutId id="2147483654" r:id="rId4"/>
-    <p:sldLayoutId id="2147483655" r:id="rId5"/>
+    <p:sldLayoutId id="2147483656" r:id="rId5"/>
+    <p:sldLayoutId id="2147483657" r:id="rId6"/>
+    <p:sldLayoutId id="2147483655" r:id="rId7"/>
   </p:sldLayoutIdLst>
   <p:timing>
     <p:tnLst>
@@ -2118,7 +2773,7 @@
       </p:par>
     </p:tnLst>
   </p:timing>
-  <p:hf hdr="0" ftr="0" dt="0"/>
+  <p:hf sldNum="0" hdr="0" ftr="0" dt="0"/>
   <p:txStyles>
     <p:titleStyle>
       <a:lvl1pPr algn="l" defTabSz="914400" rtl="0" eaLnBrk="1" latinLnBrk="0" hangingPunct="1">
@@ -2544,29 +3199,6 @@
           </a:p>
         </p:txBody>
       </p:sp>
-      <p:sp>
-        <p:nvSpPr>
-          <p:cNvPr id="2" name="Slide Number Placeholder 1"/>
-          <p:cNvSpPr>
-            <a:spLocks noGrp="1"/>
-          </p:cNvSpPr>
-          <p:nvPr>
-            <p:ph type="sldNum" sz="quarter" idx="12"/>
-          </p:nvPr>
-        </p:nvSpPr>
-        <p:spPr/>
-        <p:txBody>
-          <a:bodyPr/>
-          <a:lstStyle/>
-          <a:p>
-            <a:fld id="{4596AF0A-323D-43CD-827B-42B76E65D3DE}" type="slidenum">
-              <a:rPr lang="en-US" smtClean="0"/>
-              <a:t>2</a:t>
-            </a:fld>
-            <a:endParaRPr lang="en-US"/>
-          </a:p>
-        </p:txBody>
-      </p:sp>
     </p:spTree>
     <p:extLst>
       <p:ext uri="{BB962C8B-B14F-4D97-AF65-F5344CB8AC3E}">
@@ -2606,7 +3238,7 @@
       </p:grpSpPr>
       <p:sp>
         <p:nvSpPr>
-          <p:cNvPr id="4" name="Title 3"/>
+          <p:cNvPr id="8" name="Title 7"/>
           <p:cNvSpPr>
             <a:spLocks noGrp="1"/>
           </p:cNvSpPr>
@@ -2619,18 +3251,18 @@
           <a:bodyPr/>
           <a:lstStyle/>
           <a:p>
-            <a:endParaRPr lang="et-EE"/>
-          </a:p>
-        </p:txBody>
-      </p:sp>
-      <p:sp>
-        <p:nvSpPr>
-          <p:cNvPr id="5" name="Text Placeholder 4"/>
-          <p:cNvSpPr>
-            <a:spLocks noGrp="1"/>
-          </p:cNvSpPr>
-          <p:nvPr>
-            <p:ph type="body" idx="1"/>
+            <a:endParaRPr lang="en-GB"/>
+          </a:p>
+        </p:txBody>
+      </p:sp>
+      <p:sp>
+        <p:nvSpPr>
+          <p:cNvPr id="10" name="Text Placeholder 9"/>
+          <p:cNvSpPr>
+            <a:spLocks noGrp="1"/>
+          </p:cNvSpPr>
+          <p:nvPr>
+            <p:ph type="body" sz="quarter" idx="13"/>
           </p:nvPr>
         </p:nvSpPr>
         <p:spPr/>
@@ -2638,18 +3270,18 @@
           <a:bodyPr/>
           <a:lstStyle/>
           <a:p>
-            <a:endParaRPr lang="et-EE"/>
-          </a:p>
-        </p:txBody>
-      </p:sp>
-      <p:sp>
-        <p:nvSpPr>
-          <p:cNvPr id="6" name="Slide Number Placeholder 5"/>
-          <p:cNvSpPr>
-            <a:spLocks noGrp="1"/>
-          </p:cNvSpPr>
-          <p:nvPr>
-            <p:ph type="sldNum" sz="quarter" idx="12"/>
+            <a:endParaRPr lang="en-GB"/>
+          </a:p>
+        </p:txBody>
+      </p:sp>
+      <p:sp>
+        <p:nvSpPr>
+          <p:cNvPr id="9" name="Content Placeholder 8"/>
+          <p:cNvSpPr>
+            <a:spLocks noGrp="1"/>
+          </p:cNvSpPr>
+          <p:nvPr>
+            <p:ph idx="1"/>
           </p:nvPr>
         </p:nvSpPr>
         <p:spPr/>
@@ -2657,24 +3289,27 @@
           <a:bodyPr/>
           <a:lstStyle/>
           <a:p>
-            <a:fld id="{4596AF0A-323D-43CD-827B-42B76E65D3DE}" type="slidenum">
-              <a:rPr lang="en-US" smtClean="0"/>
-              <a:t>3</a:t>
-            </a:fld>
-            <a:endParaRPr lang="en-US"/>
+            <a:endParaRPr lang="en-GB"/>
           </a:p>
         </p:txBody>
       </p:sp>
     </p:spTree>
     <p:extLst>
       <p:ext uri="{BB962C8B-B14F-4D97-AF65-F5344CB8AC3E}">
-        <p14:creationId xmlns:p14="http://schemas.microsoft.com/office/powerpoint/2010/main" val="63851124"/>
+        <p14:creationId xmlns:p14="http://schemas.microsoft.com/office/powerpoint/2010/main" val="3605855351"/>
       </p:ext>
     </p:extLst>
   </p:cSld>
   <p:clrMapOvr>
     <a:masterClrMapping/>
   </p:clrMapOvr>
+  <p:timing>
+    <p:tnLst>
+      <p:par>
+        <p:cTn id="1" dur="indefinite" restart="never" nodeType="tmRoot"/>
+      </p:par>
+    </p:tnLst>
+  </p:timing>
 </p:sld>
 </file>
 
@@ -2716,12 +3351,12 @@
       </p:sp>
       <p:sp>
         <p:nvSpPr>
-          <p:cNvPr id="5" name="Slide Number Placeholder 4"/>
-          <p:cNvSpPr>
-            <a:spLocks noGrp="1"/>
-          </p:cNvSpPr>
-          <p:nvPr>
-            <p:ph type="sldNum" sz="quarter" idx="12"/>
+          <p:cNvPr id="5" name="Text Placeholder 4"/>
+          <p:cNvSpPr>
+            <a:spLocks noGrp="1"/>
+          </p:cNvSpPr>
+          <p:nvPr>
+            <p:ph type="body" idx="1"/>
           </p:nvPr>
         </p:nvSpPr>
         <p:spPr/>
@@ -2729,18 +3364,14 @@
           <a:bodyPr/>
           <a:lstStyle/>
           <a:p>
-            <a:fld id="{4596AF0A-323D-43CD-827B-42B76E65D3DE}" type="slidenum">
-              <a:rPr lang="en-US" smtClean="0"/>
-              <a:t>4</a:t>
-            </a:fld>
-            <a:endParaRPr lang="en-US"/>
+            <a:endParaRPr lang="et-EE"/>
           </a:p>
         </p:txBody>
       </p:sp>
     </p:spTree>
     <p:extLst>
       <p:ext uri="{BB962C8B-B14F-4D97-AF65-F5344CB8AC3E}">
-        <p14:creationId xmlns:p14="http://schemas.microsoft.com/office/powerpoint/2010/main" val="3748127241"/>
+        <p14:creationId xmlns:p14="http://schemas.microsoft.com/office/powerpoint/2010/main" val="63851124"/>
       </p:ext>
     </p:extLst>
   </p:cSld>

</xml_diff>